<commit_message>
fix clean hands on 2 specifying the exact files to use, and providing the code to load those traces
</commit_message>
<xml_diff>
--- a/docs/slides/02-security.pptx
+++ b/docs/slides/02-security.pptx
@@ -236,7 +236,7 @@
           <a:p>
             <a:fld id="{26C23BA1-C1FD-F54C-A91D-365911BB70A0}" type="datetimeFigureOut">
               <a:rPr lang="en-US" smtClean="0"/>
-              <a:t>7/22/23</a:t>
+              <a:t>10/2/23</a:t>
             </a:fld>
             <a:endParaRPr lang="en-US"/>
           </a:p>
@@ -4962,7 +4962,7 @@
           <a:p>
             <a:fld id="{6E174B13-2F4C-954D-BC49-D8D95C50C36E}" type="datetimeFigureOut">
               <a:rPr lang="en-US" smtClean="0"/>
-              <a:t>7/22/23</a:t>
+              <a:t>10/2/23</a:t>
             </a:fld>
             <a:endParaRPr lang="en-US"/>
           </a:p>
@@ -5160,7 +5160,7 @@
           <a:p>
             <a:fld id="{6E174B13-2F4C-954D-BC49-D8D95C50C36E}" type="datetimeFigureOut">
               <a:rPr lang="en-US" smtClean="0"/>
-              <a:t>7/22/23</a:t>
+              <a:t>10/2/23</a:t>
             </a:fld>
             <a:endParaRPr lang="en-US"/>
           </a:p>
@@ -5368,7 +5368,7 @@
           <a:p>
             <a:fld id="{6E174B13-2F4C-954D-BC49-D8D95C50C36E}" type="datetimeFigureOut">
               <a:rPr lang="en-US" smtClean="0"/>
-              <a:t>7/22/23</a:t>
+              <a:t>10/2/23</a:t>
             </a:fld>
             <a:endParaRPr lang="en-US"/>
           </a:p>
@@ -5566,7 +5566,7 @@
           <a:p>
             <a:fld id="{6E174B13-2F4C-954D-BC49-D8D95C50C36E}" type="datetimeFigureOut">
               <a:rPr lang="en-US" smtClean="0"/>
-              <a:t>7/22/23</a:t>
+              <a:t>10/2/23</a:t>
             </a:fld>
             <a:endParaRPr lang="en-US"/>
           </a:p>
@@ -5841,7 +5841,7 @@
           <a:p>
             <a:fld id="{6E174B13-2F4C-954D-BC49-D8D95C50C36E}" type="datetimeFigureOut">
               <a:rPr lang="en-US" smtClean="0"/>
-              <a:t>7/22/23</a:t>
+              <a:t>10/2/23</a:t>
             </a:fld>
             <a:endParaRPr lang="en-US"/>
           </a:p>
@@ -6106,7 +6106,7 @@
           <a:p>
             <a:fld id="{6E174B13-2F4C-954D-BC49-D8D95C50C36E}" type="datetimeFigureOut">
               <a:rPr lang="en-US" smtClean="0"/>
-              <a:t>7/22/23</a:t>
+              <a:t>10/2/23</a:t>
             </a:fld>
             <a:endParaRPr lang="en-US"/>
           </a:p>
@@ -6518,7 +6518,7 @@
           <a:p>
             <a:fld id="{6E174B13-2F4C-954D-BC49-D8D95C50C36E}" type="datetimeFigureOut">
               <a:rPr lang="en-US" smtClean="0"/>
-              <a:t>7/22/23</a:t>
+              <a:t>10/2/23</a:t>
             </a:fld>
             <a:endParaRPr lang="en-US"/>
           </a:p>
@@ -6659,7 +6659,7 @@
           <a:p>
             <a:fld id="{6E174B13-2F4C-954D-BC49-D8D95C50C36E}" type="datetimeFigureOut">
               <a:rPr lang="en-US" smtClean="0"/>
-              <a:t>7/22/23</a:t>
+              <a:t>10/2/23</a:t>
             </a:fld>
             <a:endParaRPr lang="en-US"/>
           </a:p>
@@ -6772,7 +6772,7 @@
           <a:p>
             <a:fld id="{6E174B13-2F4C-954D-BC49-D8D95C50C36E}" type="datetimeFigureOut">
               <a:rPr lang="en-US" smtClean="0"/>
-              <a:t>7/22/23</a:t>
+              <a:t>10/2/23</a:t>
             </a:fld>
             <a:endParaRPr lang="en-US"/>
           </a:p>
@@ -7083,7 +7083,7 @@
           <a:p>
             <a:fld id="{6E174B13-2F4C-954D-BC49-D8D95C50C36E}" type="datetimeFigureOut">
               <a:rPr lang="en-US" smtClean="0"/>
-              <a:t>7/22/23</a:t>
+              <a:t>10/2/23</a:t>
             </a:fld>
             <a:endParaRPr lang="en-US"/>
           </a:p>
@@ -7371,7 +7371,7 @@
           <a:p>
             <a:fld id="{6E174B13-2F4C-954D-BC49-D8D95C50C36E}" type="datetimeFigureOut">
               <a:rPr lang="en-US" smtClean="0"/>
-              <a:t>7/22/23</a:t>
+              <a:t>10/2/23</a:t>
             </a:fld>
             <a:endParaRPr lang="en-US"/>
           </a:p>
@@ -7612,7 +7612,7 @@
           <a:p>
             <a:fld id="{6E174B13-2F4C-954D-BC49-D8D95C50C36E}" type="datetimeFigureOut">
               <a:rPr lang="en-US" smtClean="0"/>
-              <a:t>7/22/23</a:t>
+              <a:t>10/2/23</a:t>
             </a:fld>
             <a:endParaRPr lang="en-US"/>
           </a:p>

</xml_diff>

<commit_message>
new slide for spam statistucs
</commit_message>
<xml_diff>
--- a/docs/slides/02-security.pptx
+++ b/docs/slides/02-security.pptx
@@ -16,7 +16,7 @@
     <p:sldId id="426" r:id="rId7"/>
     <p:sldId id="403" r:id="rId8"/>
     <p:sldId id="444" r:id="rId9"/>
-    <p:sldId id="404" r:id="rId10"/>
+    <p:sldId id="451" r:id="rId10"/>
     <p:sldId id="375" r:id="rId11"/>
     <p:sldId id="376" r:id="rId12"/>
     <p:sldId id="405" r:id="rId13"/>
@@ -154,6 +154,13 @@
 </p:presentation>
 </file>
 
+<file path=ppt/authors.xml><?xml version="1.0" encoding="utf-8"?>
+<p188:authorLst xmlns:a="http://schemas.openxmlformats.org/drawingml/2006/main" xmlns:r="http://schemas.openxmlformats.org/officeDocument/2006/relationships" xmlns:p188="http://schemas.microsoft.com/office/powerpoint/2018/8/main">
+  <p188:author id="{7A93AA0A-E98C-378C-6584-1A955E46BD87}" name="Shannon Leftwich" initials="SL" userId="Shannon Leftwich" providerId="None"/>
+  <p188:author id="{B354201E-F368-C5AA-E49A-05C722FF10EF}" name="Nick Feamster" initials="NF" userId="S::feamster@UCHICAGO.EDU::a8de9ba3-b3dc-4e1e-936d-2fb5b40f211d" providerId="AD"/>
+</p188:authorLst>
+</file>
+
 <file path=ppt/notesMasters/notesMaster1.xml><?xml version="1.0" encoding="utf-8"?>
 <p:notesMaster xmlns:a="http://schemas.openxmlformats.org/drawingml/2006/main" xmlns:r="http://schemas.openxmlformats.org/officeDocument/2006/relationships" xmlns:p="http://schemas.openxmlformats.org/presentationml/2006/main">
   <p:cSld>
@@ -236,7 +243,7 @@
           <a:p>
             <a:fld id="{26C23BA1-C1FD-F54C-A91D-365911BB70A0}" type="datetimeFigureOut">
               <a:rPr lang="en-US" smtClean="0"/>
-              <a:t>10/2/23</a:t>
+              <a:t>10/4/24</a:t>
             </a:fld>
             <a:endParaRPr lang="en-US"/>
           </a:p>
@@ -2091,10 +2098,55 @@
           <a:bodyPr/>
           <a:lstStyle/>
           <a:p>
-            <a:endParaRPr lang="en-US" altLang="en-US">
+            <a:r>
+              <a:rPr lang="en-US" altLang="en-US" dirty="0">
+                <a:latin typeface="Times New Roman" panose="02020603050405020304" pitchFamily="18" charset="0"/>
+                <a:ea typeface="宋体" panose="02010600030101010101" pitchFamily="2" charset="-122"/>
+              </a:rPr>
+              <a:t>The data  is based on general trends reported by organizations like Symantec and MAAWG over the past decade. </a:t>
+            </a:r>
+          </a:p>
+          <a:p>
+            <a:endParaRPr lang="en-US" altLang="en-US" dirty="0">
               <a:latin typeface="Times New Roman" panose="02020603050405020304" pitchFamily="18" charset="0"/>
               <a:ea typeface="宋体" panose="02010600030101010101" pitchFamily="2" charset="-122"/>
             </a:endParaRPr>
+          </a:p>
+          <a:p>
+            <a:r>
+              <a:rPr lang="en-US" altLang="en-US" dirty="0">
+                <a:latin typeface="Times New Roman" panose="02020603050405020304" pitchFamily="18" charset="0"/>
+                <a:ea typeface="宋体" panose="02010600030101010101" pitchFamily="2" charset="-122"/>
+              </a:rPr>
+              <a:t>For a more accurate and sourced chart, you would need to access up-to-date reports from these companies or organizations that publish detailed threat intelligence, such as:</a:t>
+            </a:r>
+          </a:p>
+          <a:p>
+            <a:r>
+              <a:rPr lang="en-US" altLang="en-US" dirty="0">
+                <a:latin typeface="Times New Roman" panose="02020603050405020304" pitchFamily="18" charset="0"/>
+                <a:ea typeface="宋体" panose="02010600030101010101" pitchFamily="2" charset="-122"/>
+              </a:rPr>
+              <a:t>- **Symantec Internet Security Threat Report**</a:t>
+            </a:r>
+          </a:p>
+          <a:p>
+            <a:r>
+              <a:rPr lang="en-US" altLang="en-US" dirty="0">
+                <a:latin typeface="Times New Roman" panose="02020603050405020304" pitchFamily="18" charset="0"/>
+                <a:ea typeface="宋体" panose="02010600030101010101" pitchFamily="2" charset="-122"/>
+              </a:rPr>
+              <a:t>- **MAAWG Email Metrics Report**</a:t>
+            </a:r>
+          </a:p>
+          <a:p>
+            <a:r>
+              <a:rPr lang="en-US" altLang="en-US" dirty="0">
+                <a:latin typeface="Times New Roman" panose="02020603050405020304" pitchFamily="18" charset="0"/>
+                <a:ea typeface="宋体" panose="02010600030101010101" pitchFamily="2" charset="-122"/>
+              </a:rPr>
+              <a:t>- **Cisco Annual Cybersecurity Report**</a:t>
+            </a:r>
           </a:p>
         </p:txBody>
       </p:sp>
@@ -4962,7 +5014,7 @@
           <a:p>
             <a:fld id="{6E174B13-2F4C-954D-BC49-D8D95C50C36E}" type="datetimeFigureOut">
               <a:rPr lang="en-US" smtClean="0"/>
-              <a:t>10/2/23</a:t>
+              <a:t>10/4/24</a:t>
             </a:fld>
             <a:endParaRPr lang="en-US"/>
           </a:p>
@@ -5160,7 +5212,7 @@
           <a:p>
             <a:fld id="{6E174B13-2F4C-954D-BC49-D8D95C50C36E}" type="datetimeFigureOut">
               <a:rPr lang="en-US" smtClean="0"/>
-              <a:t>10/2/23</a:t>
+              <a:t>10/4/24</a:t>
             </a:fld>
             <a:endParaRPr lang="en-US"/>
           </a:p>
@@ -5368,7 +5420,7 @@
           <a:p>
             <a:fld id="{6E174B13-2F4C-954D-BC49-D8D95C50C36E}" type="datetimeFigureOut">
               <a:rPr lang="en-US" smtClean="0"/>
-              <a:t>10/2/23</a:t>
+              <a:t>10/4/24</a:t>
             </a:fld>
             <a:endParaRPr lang="en-US"/>
           </a:p>
@@ -5566,7 +5618,7 @@
           <a:p>
             <a:fld id="{6E174B13-2F4C-954D-BC49-D8D95C50C36E}" type="datetimeFigureOut">
               <a:rPr lang="en-US" smtClean="0"/>
-              <a:t>10/2/23</a:t>
+              <a:t>10/4/24</a:t>
             </a:fld>
             <a:endParaRPr lang="en-US"/>
           </a:p>
@@ -5841,7 +5893,7 @@
           <a:p>
             <a:fld id="{6E174B13-2F4C-954D-BC49-D8D95C50C36E}" type="datetimeFigureOut">
               <a:rPr lang="en-US" smtClean="0"/>
-              <a:t>10/2/23</a:t>
+              <a:t>10/4/24</a:t>
             </a:fld>
             <a:endParaRPr lang="en-US"/>
           </a:p>
@@ -6106,7 +6158,7 @@
           <a:p>
             <a:fld id="{6E174B13-2F4C-954D-BC49-D8D95C50C36E}" type="datetimeFigureOut">
               <a:rPr lang="en-US" smtClean="0"/>
-              <a:t>10/2/23</a:t>
+              <a:t>10/4/24</a:t>
             </a:fld>
             <a:endParaRPr lang="en-US"/>
           </a:p>
@@ -6518,7 +6570,7 @@
           <a:p>
             <a:fld id="{6E174B13-2F4C-954D-BC49-D8D95C50C36E}" type="datetimeFigureOut">
               <a:rPr lang="en-US" smtClean="0"/>
-              <a:t>10/2/23</a:t>
+              <a:t>10/4/24</a:t>
             </a:fld>
             <a:endParaRPr lang="en-US"/>
           </a:p>
@@ -6659,7 +6711,7 @@
           <a:p>
             <a:fld id="{6E174B13-2F4C-954D-BC49-D8D95C50C36E}" type="datetimeFigureOut">
               <a:rPr lang="en-US" smtClean="0"/>
-              <a:t>10/2/23</a:t>
+              <a:t>10/4/24</a:t>
             </a:fld>
             <a:endParaRPr lang="en-US"/>
           </a:p>
@@ -6772,7 +6824,7 @@
           <a:p>
             <a:fld id="{6E174B13-2F4C-954D-BC49-D8D95C50C36E}" type="datetimeFigureOut">
               <a:rPr lang="en-US" smtClean="0"/>
-              <a:t>10/2/23</a:t>
+              <a:t>10/4/24</a:t>
             </a:fld>
             <a:endParaRPr lang="en-US"/>
           </a:p>
@@ -7083,7 +7135,7 @@
           <a:p>
             <a:fld id="{6E174B13-2F4C-954D-BC49-D8D95C50C36E}" type="datetimeFigureOut">
               <a:rPr lang="en-US" smtClean="0"/>
-              <a:t>10/2/23</a:t>
+              <a:t>10/4/24</a:t>
             </a:fld>
             <a:endParaRPr lang="en-US"/>
           </a:p>
@@ -7371,7 +7423,7 @@
           <a:p>
             <a:fld id="{6E174B13-2F4C-954D-BC49-D8D95C50C36E}" type="datetimeFigureOut">
               <a:rPr lang="en-US" smtClean="0"/>
-              <a:t>10/2/23</a:t>
+              <a:t>10/4/24</a:t>
             </a:fld>
             <a:endParaRPr lang="en-US"/>
           </a:p>
@@ -7612,7 +7664,7 @@
           <a:p>
             <a:fld id="{6E174B13-2F4C-954D-BC49-D8D95C50C36E}" type="datetimeFigureOut">
               <a:rPr lang="en-US" smtClean="0"/>
-              <a:t>10/2/23</a:t>
+              <a:t>10/4/24</a:t>
             </a:fld>
             <a:endParaRPr lang="en-US"/>
           </a:p>
@@ -31196,13 +31248,23 @@
             <p:ph type="title"/>
           </p:nvPr>
         </p:nvSpPr>
-        <p:spPr/>
+        <p:spPr>
+          <a:xfrm>
+            <a:off x="532088" y="18255"/>
+            <a:ext cx="10515600" cy="1325563"/>
+          </a:xfrm>
+        </p:spPr>
         <p:txBody>
-          <a:bodyPr/>
+          <a:bodyPr>
+            <a:noAutofit/>
+          </a:bodyPr>
           <a:lstStyle/>
           <a:p>
-            <a:r>
-              <a:rPr lang="en-US" altLang="en-US"/>
+            <a:pPr algn="l"/>
+            <a:r>
+              <a:rPr lang="en-US" altLang="en-US" sz="4000" b="0" dirty="0">
+                <a:latin typeface="+mj-lt"/>
+              </a:rPr>
               <a:t>Unwanted Traffic: Spam</a:t>
             </a:r>
           </a:p>
@@ -31224,56 +31286,119 @@
             <p:ph idx="1"/>
           </p:nvPr>
         </p:nvSpPr>
+        <p:spPr>
+          <a:xfrm>
+            <a:off x="751115" y="1116884"/>
+            <a:ext cx="10515600" cy="881110"/>
+          </a:xfrm>
+        </p:spPr>
+        <p:txBody>
+          <a:bodyPr>
+            <a:normAutofit/>
+          </a:bodyPr>
+          <a:lstStyle/>
+          <a:p>
+            <a:pPr>
+              <a:defRPr/>
+            </a:pPr>
+            <a:r>
+              <a:rPr lang="en-US" sz="2400" dirty="0">
+                <a:solidFill>
+                  <a:srgbClr val="FF0000"/>
+                </a:solidFill>
+              </a:rPr>
+              <a:t>Spam rates are declining, but phishing attacks are on the rise.</a:t>
+            </a:r>
+            <a:endParaRPr lang="en-US" sz="2400" dirty="0"/>
+          </a:p>
+          <a:p>
+            <a:pPr marL="0" indent="0">
+              <a:buNone/>
+              <a:defRPr/>
+            </a:pPr>
+            <a:r>
+              <a:rPr lang="en-US" sz="1400" dirty="0"/>
+              <a:t>	</a:t>
+            </a:r>
+            <a:endParaRPr lang="en-US" dirty="0"/>
+          </a:p>
+        </p:txBody>
+      </p:sp>
+      <p:sp>
+        <p:nvSpPr>
+          <p:cNvPr id="5" name="Slide Number Placeholder 4">
+            <a:extLst>
+              <a:ext uri="{FF2B5EF4-FFF2-40B4-BE49-F238E27FC236}">
+                <a16:creationId xmlns:a16="http://schemas.microsoft.com/office/drawing/2014/main" id="{9CE6DBFA-1474-D1C2-2CD4-17DE43768ADD}"/>
+              </a:ext>
+            </a:extLst>
+          </p:cNvPr>
+          <p:cNvSpPr>
+            <a:spLocks noGrp="1"/>
+          </p:cNvSpPr>
+          <p:nvPr>
+            <p:ph type="sldNum" sz="quarter" idx="12"/>
+          </p:nvPr>
+        </p:nvSpPr>
         <p:spPr/>
         <p:txBody>
           <a:bodyPr/>
           <a:lstStyle/>
           <a:p>
-            <a:pPr>
-              <a:defRPr/>
-            </a:pPr>
-            <a:r>
-              <a:rPr lang="en-US" dirty="0">
-                <a:solidFill>
-                  <a:srgbClr val="FF0000"/>
-                </a:solidFill>
-              </a:rPr>
-              <a:t>70-90%</a:t>
-            </a:r>
-            <a:r>
-              <a:rPr lang="en-US" dirty="0"/>
-              <a:t> of all email traffic is spam</a:t>
-            </a:r>
-          </a:p>
+            <a:fld id="{C1FF6DA9-008F-8B48-92A6-B652298478BF}" type="slidenum">
+              <a:rPr lang="en-US" smtClean="0"/>
+              <a:t>9</a:t>
+            </a:fld>
+            <a:endParaRPr lang="en-US"/>
+          </a:p>
+        </p:txBody>
+      </p:sp>
+      <p:sp>
+        <p:nvSpPr>
+          <p:cNvPr id="4" name="TextBox 3">
+            <a:extLst>
+              <a:ext uri="{FF2B5EF4-FFF2-40B4-BE49-F238E27FC236}">
+                <a16:creationId xmlns:a16="http://schemas.microsoft.com/office/drawing/2014/main" id="{C1E5A3F4-BA54-65A1-702E-FF049D41DECC}"/>
+              </a:ext>
+            </a:extLst>
+          </p:cNvPr>
+          <p:cNvSpPr txBox="1"/>
+          <p:nvPr/>
+        </p:nvSpPr>
+        <p:spPr>
+          <a:xfrm>
+            <a:off x="472191" y="5844698"/>
+            <a:ext cx="6094476" cy="369332"/>
+          </a:xfrm>
+          <a:prstGeom prst="rect">
+            <a:avLst/>
+          </a:prstGeom>
+          <a:noFill/>
+        </p:spPr>
+        <p:txBody>
+          <a:bodyPr wrap="square">
+            <a:spAutoFit/>
+          </a:bodyPr>
+          <a:lstStyle/>
           <a:p>
             <a:pPr marL="0" indent="0">
               <a:buNone/>
               <a:defRPr/>
             </a:pPr>
             <a:r>
-              <a:rPr lang="en-US" sz="1400" dirty="0"/>
-              <a:t>	</a:t>
-            </a:r>
-            <a:r>
-              <a:rPr lang="en-US" sz="1600" dirty="0"/>
-              <a:t>(Sources: Symantec 2010, MAAWG 2011, Symantec 2013)</a:t>
-            </a:r>
-            <a:endParaRPr lang="en-US" dirty="0"/>
-          </a:p>
-          <a:p>
-            <a:pPr>
-              <a:defRPr/>
-            </a:pPr>
+              <a:rPr lang="en-US" sz="1800" dirty="0"/>
+              <a:t>(Sources: Symantec, MAAWG, Cisco)</a:t>
+            </a:r>
             <a:endParaRPr lang="en-US" dirty="0"/>
           </a:p>
         </p:txBody>
       </p:sp>
       <p:pic>
         <p:nvPicPr>
-          <p:cNvPr id="27651" name="Picture 10" descr="spam-over-time_cut.png">
+          <p:cNvPr id="6" name="Picture 5" descr="A graph showing the number of spam rate and phishing attacks&#10;&#10;Description automatically generated">
             <a:extLst>
               <a:ext uri="{FF2B5EF4-FFF2-40B4-BE49-F238E27FC236}">
-                <a16:creationId xmlns:a16="http://schemas.microsoft.com/office/drawing/2014/main" id="{93A0C2BB-66FC-B44F-9A45-ED1D9959375F}"/>
+                <a16:creationId xmlns:a16="http://schemas.microsoft.com/office/drawing/2014/main" id="{74631E2A-FC81-8E9B-7316-FC5D4E8A0C8A}"/>
               </a:ext>
             </a:extLst>
           </p:cNvPr>
@@ -31283,49 +31408,19 @@
           <p:nvPr/>
         </p:nvPicPr>
         <p:blipFill>
-          <a:blip r:embed="rId3">
-            <a:extLst>
-              <a:ext uri="{28A0092B-C50C-407E-A947-70E740481C1C}">
-                <a14:useLocalDpi xmlns:a14="http://schemas.microsoft.com/office/drawing/2010/main" val="0"/>
-              </a:ext>
-            </a:extLst>
-          </a:blip>
-          <a:srcRect/>
+          <a:blip r:embed="rId3"/>
           <a:stretch>
             <a:fillRect/>
           </a:stretch>
         </p:blipFill>
-        <p:spPr bwMode="auto">
+        <p:spPr>
           <a:xfrm>
-            <a:off x="2355851" y="2438400"/>
-            <a:ext cx="7480300" cy="3403600"/>
+            <a:off x="2362199" y="1771061"/>
+            <a:ext cx="6123189" cy="3646393"/>
           </a:xfrm>
           <a:prstGeom prst="rect">
             <a:avLst/>
           </a:prstGeom>
-          <a:noFill/>
-          <a:ln>
-            <a:noFill/>
-          </a:ln>
-          <a:extLst>
-            <a:ext uri="{909E8E84-426E-40DD-AFC4-6F175D3DCCD1}">
-              <a14:hiddenFill xmlns:a14="http://schemas.microsoft.com/office/drawing/2010/main">
-                <a:solidFill>
-                  <a:srgbClr val="FFFFFF"/>
-                </a:solidFill>
-              </a14:hiddenFill>
-            </a:ext>
-            <a:ext uri="{91240B29-F687-4F45-9708-019B960494DF}">
-              <a14:hiddenLine xmlns:a14="http://schemas.microsoft.com/office/drawing/2010/main" w="9525">
-                <a:solidFill>
-                  <a:srgbClr val="000000"/>
-                </a:solidFill>
-                <a:miter lim="800000"/>
-                <a:headEnd/>
-                <a:tailEnd/>
-              </a14:hiddenLine>
-            </a:ext>
-          </a:extLst>
         </p:spPr>
       </p:pic>
     </p:spTree>

</xml_diff>